<commit_message>
modify powerpoint + add pdf version
</commit_message>
<xml_diff>
--- a/presentation.pptx
+++ b/presentation.pptx
@@ -452,7 +452,7 @@
           <a:p>
             <a:fld id="{B7219623-745A-4F10-8D04-83D36EEC96D6}" type="datetimeFigureOut">
               <a:rPr lang="en-US" smtClean="0"/>
-              <a:t>07/01/18</a:t>
+              <a:t>07/03/18</a:t>
             </a:fld>
             <a:endParaRPr lang="en-US"/>
           </a:p>
@@ -1540,7 +1540,7 @@
           <a:p>
             <a:fld id="{B7219623-745A-4F10-8D04-83D36EEC96D6}" type="datetimeFigureOut">
               <a:rPr lang="en-US" smtClean="0"/>
-              <a:t>07/01/18</a:t>
+              <a:t>07/03/18</a:t>
             </a:fld>
             <a:endParaRPr lang="en-US"/>
           </a:p>
@@ -2520,7 +2520,7 @@
           <a:p>
             <a:fld id="{B7219623-745A-4F10-8D04-83D36EEC96D6}" type="datetimeFigureOut">
               <a:rPr lang="en-US" smtClean="0"/>
-              <a:t>07/01/18</a:t>
+              <a:t>07/03/18</a:t>
             </a:fld>
             <a:endParaRPr lang="en-US"/>
           </a:p>
@@ -3654,7 +3654,7 @@
           <a:p>
             <a:fld id="{B7219623-745A-4F10-8D04-83D36EEC96D6}" type="datetimeFigureOut">
               <a:rPr lang="en-US" smtClean="0"/>
-              <a:t>07/01/18</a:t>
+              <a:t>07/03/18</a:t>
             </a:fld>
             <a:endParaRPr lang="en-US"/>
           </a:p>
@@ -4687,7 +4687,7 @@
           <a:p>
             <a:fld id="{B7219623-745A-4F10-8D04-83D36EEC96D6}" type="datetimeFigureOut">
               <a:rPr lang="en-US" smtClean="0"/>
-              <a:t>07/01/18</a:t>
+              <a:t>07/03/18</a:t>
             </a:fld>
             <a:endParaRPr lang="en-US"/>
           </a:p>
@@ -5347,7 +5347,7 @@
           <a:p>
             <a:fld id="{B7219623-745A-4F10-8D04-83D36EEC96D6}" type="datetimeFigureOut">
               <a:rPr lang="en-US" smtClean="0"/>
-              <a:t>07/01/18</a:t>
+              <a:t>07/03/18</a:t>
             </a:fld>
             <a:endParaRPr lang="en-US"/>
           </a:p>
@@ -6208,7 +6208,7 @@
           <a:p>
             <a:fld id="{B7219623-745A-4F10-8D04-83D36EEC96D6}" type="datetimeFigureOut">
               <a:rPr lang="en-US" smtClean="0"/>
-              <a:t>07/01/18</a:t>
+              <a:t>07/03/18</a:t>
             </a:fld>
             <a:endParaRPr lang="en-US"/>
           </a:p>
@@ -6398,7 +6398,7 @@
           <a:p>
             <a:fld id="{B7219623-745A-4F10-8D04-83D36EEC96D6}" type="datetimeFigureOut">
               <a:rPr lang="en-US" smtClean="0"/>
-              <a:t>07/01/18</a:t>
+              <a:t>07/03/18</a:t>
             </a:fld>
             <a:endParaRPr lang="en-US"/>
           </a:p>
@@ -7370,7 +7370,7 @@
           <a:p>
             <a:fld id="{B7219623-745A-4F10-8D04-83D36EEC96D6}" type="datetimeFigureOut">
               <a:rPr lang="en-US" smtClean="0"/>
-              <a:t>07/01/18</a:t>
+              <a:t>07/03/18</a:t>
             </a:fld>
             <a:endParaRPr lang="en-US"/>
           </a:p>
@@ -7581,7 +7581,7 @@
           <a:p>
             <a:fld id="{B7219623-745A-4F10-8D04-83D36EEC96D6}" type="datetimeFigureOut">
               <a:rPr lang="en-US" smtClean="0"/>
-              <a:t>07/01/18</a:t>
+              <a:t>07/03/18</a:t>
             </a:fld>
             <a:endParaRPr lang="en-US"/>
           </a:p>
@@ -8615,7 +8615,7 @@
           <a:p>
             <a:fld id="{B7219623-745A-4F10-8D04-83D36EEC96D6}" type="datetimeFigureOut">
               <a:rPr lang="en-US" smtClean="0"/>
-              <a:t>07/01/18</a:t>
+              <a:t>07/03/18</a:t>
             </a:fld>
             <a:endParaRPr lang="en-US"/>
           </a:p>
@@ -8887,7 +8887,7 @@
           <a:p>
             <a:fld id="{B7219623-745A-4F10-8D04-83D36EEC96D6}" type="datetimeFigureOut">
               <a:rPr lang="en-US" smtClean="0"/>
-              <a:t>07/01/18</a:t>
+              <a:t>07/03/18</a:t>
             </a:fld>
             <a:endParaRPr lang="en-US"/>
           </a:p>
@@ -9297,7 +9297,7 @@
           <a:p>
             <a:fld id="{B7219623-745A-4F10-8D04-83D36EEC96D6}" type="datetimeFigureOut">
               <a:rPr lang="en-US" smtClean="0"/>
-              <a:t>07/01/18</a:t>
+              <a:t>07/03/18</a:t>
             </a:fld>
             <a:endParaRPr lang="en-US"/>
           </a:p>
@@ -9424,7 +9424,7 @@
           <a:p>
             <a:fld id="{B7219623-745A-4F10-8D04-83D36EEC96D6}" type="datetimeFigureOut">
               <a:rPr lang="en-US" smtClean="0"/>
-              <a:t>07/01/18</a:t>
+              <a:t>07/03/18</a:t>
             </a:fld>
             <a:endParaRPr lang="en-US"/>
           </a:p>
@@ -9519,7 +9519,7 @@
           <a:p>
             <a:fld id="{B7219623-745A-4F10-8D04-83D36EEC96D6}" type="datetimeFigureOut">
               <a:rPr lang="en-US" smtClean="0"/>
-              <a:t>07/01/18</a:t>
+              <a:t>07/03/18</a:t>
             </a:fld>
             <a:endParaRPr lang="en-US"/>
           </a:p>
@@ -10600,7 +10600,7 @@
           <a:p>
             <a:fld id="{B7219623-745A-4F10-8D04-83D36EEC96D6}" type="datetimeFigureOut">
               <a:rPr lang="en-US" smtClean="0"/>
-              <a:t>07/01/18</a:t>
+              <a:t>07/03/18</a:t>
             </a:fld>
             <a:endParaRPr lang="en-US"/>
           </a:p>
@@ -11708,7 +11708,7 @@
           <a:p>
             <a:fld id="{B7219623-745A-4F10-8D04-83D36EEC96D6}" type="datetimeFigureOut">
               <a:rPr lang="en-US" smtClean="0"/>
-              <a:t>07/01/18</a:t>
+              <a:t>07/03/18</a:t>
             </a:fld>
             <a:endParaRPr lang="en-US"/>
           </a:p>
@@ -12705,7 +12705,7 @@
           <a:p>
             <a:fld id="{B7219623-745A-4F10-8D04-83D36EEC96D6}" type="datetimeFigureOut">
               <a:rPr lang="en-US" smtClean="0"/>
-              <a:t>07/01/18</a:t>
+              <a:t>07/03/18</a:t>
             </a:fld>
             <a:endParaRPr lang="en-US"/>
           </a:p>
@@ -13282,8 +13282,8 @@
         </p:nvSpPr>
         <p:spPr>
           <a:xfrm>
-            <a:off x="714894" y="2656685"/>
-            <a:ext cx="8825658" cy="2677648"/>
+            <a:off x="714893" y="2656685"/>
+            <a:ext cx="9883833" cy="2677648"/>
           </a:xfrm>
         </p:spPr>
         <p:txBody>
@@ -13292,7 +13292,7 @@
           <a:p>
             <a:r>
               <a:rPr lang="en-US" sz="4400" b="1" dirty="0"/>
-              <a:t>Ready Hack One Web Service</a:t>
+              <a:t>Ready Hacker One Web Service</a:t>
             </a:r>
           </a:p>
         </p:txBody>
@@ -14010,6 +14010,44 @@
             <a:r>
               <a:rPr lang="en-US" sz="4000" b="1" u="sng" dirty="0"/>
               <a:t>Architecture</a:t>
+            </a:r>
+          </a:p>
+        </p:txBody>
+      </p:sp>
+      <p:sp>
+        <p:nvSpPr>
+          <p:cNvPr id="4" name="Rectangle 3">
+            <a:extLst>
+              <a:ext uri="{FF2B5EF4-FFF2-40B4-BE49-F238E27FC236}">
+                <a16:creationId xmlns:a16="http://schemas.microsoft.com/office/drawing/2014/main" id="{43526721-EE9D-4843-BE40-06864699AC80}"/>
+              </a:ext>
+            </a:extLst>
+          </p:cNvPr>
+          <p:cNvSpPr/>
+          <p:nvPr/>
+        </p:nvSpPr>
+        <p:spPr>
+          <a:xfrm>
+            <a:off x="5614892" y="6475613"/>
+            <a:ext cx="6836228" cy="307777"/>
+          </a:xfrm>
+          <a:prstGeom prst="rect">
+            <a:avLst/>
+          </a:prstGeom>
+        </p:spPr>
+        <p:txBody>
+          <a:bodyPr wrap="square">
+            <a:spAutoFit/>
+          </a:bodyPr>
+          <a:lstStyle/>
+          <a:p>
+            <a:r>
+              <a:rPr lang="en-US" sz="1400" b="1" i="1" dirty="0" err="1"/>
+              <a:t>Github</a:t>
+            </a:r>
+            <a:r>
+              <a:rPr lang="en-US" sz="1400" b="1" i="1" dirty="0"/>
+              <a:t>: https://github.com/josephkniest/ready-hacker-one-web-service</a:t>
             </a:r>
           </a:p>
         </p:txBody>

</xml_diff>